<commit_message>
Tradução README.md e Slides de 04 - String Variables
</commit_message>
<xml_diff>
--- a/python-for-beginners/Slides/4 - StringVariables.pptx
+++ b/python-for-beginners/Slides/4 - StringVariables.pptx
@@ -353,7 +353,7 @@
               <a:rPr lang="en-US" smtClean="0">
                 <a:latin typeface="Segoe UI" pitchFamily="34" charset="0"/>
               </a:rPr>
-              <a:t>6/9/2019 10:26 AM</a:t>
+              <a:t>7/14/2020 5:00 PM</a:t>
             </a:fld>
             <a:endParaRPr lang="en-US" dirty="0">
               <a:latin typeface="Segoe UI" pitchFamily="34" charset="0"/>
@@ -631,7 +631,7 @@
           <a:p>
             <a:fld id="{38EEC551-8CDA-4EB6-89BB-2A86C9F091C8}" type="datetime8">
               <a:rPr lang="en-US" smtClean="0"/>
-              <a:t>6/9/2019 10:26 AM</a:t>
+              <a:t>7/14/2020 5:00 PM</a:t>
             </a:fld>
             <a:endParaRPr lang="en-US" dirty="0"/>
           </a:p>
@@ -965,7 +965,7 @@
           <a:p>
             <a:fld id="{6108602D-D426-4C00-B215-BFA18C076426}" type="datetime8">
               <a:rPr lang="en-US" smtClean="0"/>
-              <a:t>6/9/2019 10:26 AM</a:t>
+              <a:t>7/14/2020 5:00 PM</a:t>
             </a:fld>
             <a:endParaRPr lang="en-US" dirty="0"/>
           </a:p>
@@ -1130,7 +1130,7 @@
           <a:p>
             <a:fld id="{6108602D-D426-4C00-B215-BFA18C076426}" type="datetime8">
               <a:rPr lang="en-US" smtClean="0"/>
-              <a:t>6/9/2019 10:26 AM</a:t>
+              <a:t>7/14/2020 5:00 PM</a:t>
             </a:fld>
             <a:endParaRPr lang="en-US" dirty="0"/>
           </a:p>
@@ -1295,7 +1295,7 @@
           <a:p>
             <a:fld id="{6108602D-D426-4C00-B215-BFA18C076426}" type="datetime8">
               <a:rPr lang="en-US" smtClean="0"/>
-              <a:t>6/9/2019 10:26 AM</a:t>
+              <a:t>7/14/2020 5:00 PM</a:t>
             </a:fld>
             <a:endParaRPr lang="en-US" dirty="0"/>
           </a:p>
@@ -1460,7 +1460,7 @@
           <a:p>
             <a:fld id="{6108602D-D426-4C00-B215-BFA18C076426}" type="datetime8">
               <a:rPr lang="en-US" smtClean="0"/>
-              <a:t>6/9/2019 10:26 AM</a:t>
+              <a:t>7/14/2020 5:00 PM</a:t>
             </a:fld>
             <a:endParaRPr lang="en-US" dirty="0"/>
           </a:p>
@@ -39758,12 +39758,20 @@
           </a:lstStyle>
           <a:p>
             <a:r>
+              <a:rPr lang="en-US" dirty="0" err="1">
+                <a:solidFill>
+                  <a:schemeClr val="bg1"/>
+                </a:solidFill>
+              </a:rPr>
+              <a:t>Trabalhando</a:t>
+            </a:r>
+            <a:r>
               <a:rPr lang="en-US" dirty="0">
                 <a:solidFill>
                   <a:schemeClr val="bg1"/>
                 </a:solidFill>
               </a:rPr>
-              <a:t>Working with strings</a:t>
+              <a:t> com Strings</a:t>
             </a:r>
           </a:p>
         </p:txBody>
@@ -39778,11 +39786,11 @@
   <p:clrMapOvr>
     <a:masterClrMapping/>
   </p:clrMapOvr>
-  <mc:AlternateContent xmlns:mc="http://schemas.openxmlformats.org/markup-compatibility/2006">
-    <mc:Choice xmlns:p14="http://schemas.microsoft.com/office/powerpoint/2010/main" Requires="p14">
+  <mc:AlternateContent xmlns:mc="http://schemas.openxmlformats.org/markup-compatibility/2006" xmlns:p14="http://schemas.microsoft.com/office/powerpoint/2010/main">
+    <mc:Choice Requires="p14">
       <p:transition p14:dur="10"/>
     </mc:Choice>
-    <mc:Fallback>
+    <mc:Fallback xmlns="">
       <p:transition/>
     </mc:Fallback>
   </mc:AlternateContent>
@@ -39822,9 +39830,10 @@
           <a:lstStyle/>
           <a:p>
             <a:r>
-              <a:rPr lang="en-US" b="1" dirty="0"/>
-              <a:t>Strings can be stored in variables</a:t>
+              <a:rPr lang="pt-BR" sz="4400" b="1" dirty="0"/>
+              <a:t>Strings podem ser armazenadas em variáveis</a:t>
             </a:r>
+            <a:endParaRPr lang="en-US" sz="4400" b="1" dirty="0"/>
           </a:p>
         </p:txBody>
       </p:sp>
@@ -39850,7 +39859,7 @@
           <a:p>
             <a:r>
               <a:rPr lang="en-CA" dirty="0" err="1"/>
-              <a:t>first_name</a:t>
+              <a:t>nome</a:t>
             </a:r>
             <a:r>
               <a:rPr lang="en-CA" dirty="0"/>
@@ -39872,7 +39881,7 @@
             </a:r>
             <a:r>
               <a:rPr lang="en-CA" dirty="0" err="1"/>
-              <a:t>first_name</a:t>
+              <a:t>nome</a:t>
             </a:r>
             <a:r>
               <a:rPr lang="en-CA" dirty="0"/>
@@ -40173,11 +40182,11 @@
   <p:clrMapOvr>
     <a:masterClrMapping/>
   </p:clrMapOvr>
-  <mc:AlternateContent xmlns:mc="http://schemas.openxmlformats.org/markup-compatibility/2006">
-    <mc:Choice xmlns:p14="http://schemas.microsoft.com/office/powerpoint/2010/main" Requires="p14">
+  <mc:AlternateContent xmlns:mc="http://schemas.openxmlformats.org/markup-compatibility/2006" xmlns:p14="http://schemas.microsoft.com/office/powerpoint/2010/main">
+    <mc:Choice Requires="p14">
       <p:transition p14:dur="10"/>
     </mc:Choice>
-    <mc:Fallback>
+    <mc:Fallback xmlns="">
       <p:transition/>
     </mc:Fallback>
   </mc:AlternateContent>
@@ -40217,8 +40226,8 @@
           <a:lstStyle/>
           <a:p>
             <a:r>
-              <a:rPr lang="en-US" b="1" dirty="0"/>
-              <a:t>You can combine strings with +</a:t>
+              <a:rPr lang="pt-BR" b="1" dirty="0"/>
+              <a:t>Você pode combinar strings com +</a:t>
             </a:r>
             <a:endParaRPr lang="en-US" dirty="0"/>
           </a:p>
@@ -40246,7 +40255,7 @@
           <a:p>
             <a:r>
               <a:rPr lang="en-CA" dirty="0" err="1"/>
-              <a:t>first_name</a:t>
+              <a:t>nome</a:t>
             </a:r>
             <a:r>
               <a:rPr lang="en-CA" dirty="0"/>
@@ -40264,7 +40273,7 @@
           <a:p>
             <a:r>
               <a:rPr lang="en-CA" dirty="0" err="1"/>
-              <a:t>last_name</a:t>
+              <a:t>sobrenome</a:t>
             </a:r>
             <a:r>
               <a:rPr lang="en-CA" dirty="0"/>
@@ -40286,7 +40295,7 @@
             </a:r>
             <a:r>
               <a:rPr lang="en-CA" dirty="0" err="1"/>
-              <a:t>first_name</a:t>
+              <a:t>nome</a:t>
             </a:r>
             <a:r>
               <a:rPr lang="en-CA" dirty="0"/>
@@ -40294,7 +40303,7 @@
             </a:r>
             <a:r>
               <a:rPr lang="en-CA" dirty="0" err="1"/>
-              <a:t>last_name</a:t>
+              <a:t>sobrenome</a:t>
             </a:r>
             <a:r>
               <a:rPr lang="en-CA" dirty="0"/>
@@ -40312,7 +40321,7 @@
                   <a:srgbClr val="C00000"/>
                 </a:solidFill>
               </a:rPr>
-              <a:t>'Hello ' </a:t>
+              <a:t>'Oi ' </a:t>
             </a:r>
             <a:r>
               <a:rPr lang="en-CA" dirty="0"/>
@@ -40320,7 +40329,7 @@
             </a:r>
             <a:r>
               <a:rPr lang="en-CA" dirty="0" err="1"/>
-              <a:t>first_name</a:t>
+              <a:t>nome</a:t>
             </a:r>
             <a:r>
               <a:rPr lang="en-CA" dirty="0"/>
@@ -40340,7 +40349,7 @@
             </a:r>
             <a:r>
               <a:rPr lang="en-CA" dirty="0" err="1"/>
-              <a:t>last_name</a:t>
+              <a:t>sobrenome</a:t>
             </a:r>
             <a:r>
               <a:rPr lang="en-CA" dirty="0"/>
@@ -40632,7 +40641,7 @@
                   <a:schemeClr val="bg1"/>
                 </a:solidFill>
               </a:rPr>
-              <a:t>Hello Susan Ibach</a:t>
+              <a:t>Oi Susan Ibach</a:t>
             </a:r>
             <a:endParaRPr lang="en-CA" dirty="0"/>
           </a:p>
@@ -40654,11 +40663,11 @@
   <p:clrMapOvr>
     <a:masterClrMapping/>
   </p:clrMapOvr>
-  <mc:AlternateContent xmlns:mc="http://schemas.openxmlformats.org/markup-compatibility/2006">
-    <mc:Choice xmlns:p14="http://schemas.microsoft.com/office/powerpoint/2010/main" Requires="p14">
+  <mc:AlternateContent xmlns:mc="http://schemas.openxmlformats.org/markup-compatibility/2006" xmlns:p14="http://schemas.microsoft.com/office/powerpoint/2010/main">
+    <mc:Choice Requires="p14">
       <p:transition p14:dur="10"/>
     </mc:Choice>
-    <mc:Fallback>
+    <mc:Fallback xmlns="">
       <p:transition/>
     </mc:Fallback>
   </mc:AlternateContent>
@@ -40698,10 +40707,10 @@
           <a:lstStyle/>
           <a:p>
             <a:r>
-              <a:rPr lang="en-US" b="1" dirty="0"/>
-              <a:t>You can use functions to modify strings</a:t>
+              <a:rPr lang="pt-BR" sz="4400" b="1" dirty="0"/>
+              <a:t>Você pode usar funções para modificar strings</a:t>
             </a:r>
-            <a:endParaRPr lang="en-US" dirty="0"/>
+            <a:endParaRPr lang="en-US" sz="4400" dirty="0"/>
           </a:p>
         </p:txBody>
       </p:sp>
@@ -40726,8 +40735,12 @@
           <a:lstStyle/>
           <a:p>
             <a:r>
+              <a:rPr lang="en-CA" dirty="0" err="1"/>
+              <a:t>sentenca</a:t>
+            </a:r>
+            <a:r>
               <a:rPr lang="en-CA" dirty="0"/>
-              <a:t>sentence = </a:t>
+              <a:t> = </a:t>
             </a:r>
             <a:r>
               <a:rPr lang="en-CA" dirty="0">
@@ -40745,7 +40758,7 @@
             </a:r>
             <a:r>
               <a:rPr lang="en-CA" dirty="0" err="1"/>
-              <a:t>sentence.upper</a:t>
+              <a:t>sentenca.upper</a:t>
             </a:r>
             <a:r>
               <a:rPr lang="en-CA" dirty="0"/>
@@ -40759,7 +40772,7 @@
             </a:r>
             <a:r>
               <a:rPr lang="en-CA" dirty="0" err="1"/>
-              <a:t>sentence.lower</a:t>
+              <a:t>sentenca.lower</a:t>
             </a:r>
             <a:r>
               <a:rPr lang="en-CA" dirty="0"/>
@@ -40773,7 +40786,7 @@
             </a:r>
             <a:r>
               <a:rPr lang="en-CA" dirty="0" err="1"/>
-              <a:t>sentence.capitalize</a:t>
+              <a:t>sentenca.capitalize</a:t>
             </a:r>
             <a:r>
               <a:rPr lang="en-CA" dirty="0"/>
@@ -40787,7 +40800,7 @@
             </a:r>
             <a:r>
               <a:rPr lang="en-CA" dirty="0" err="1"/>
-              <a:t>sentence.count</a:t>
+              <a:t>sentenca.count</a:t>
             </a:r>
             <a:r>
               <a:rPr lang="en-CA" dirty="0"/>
@@ -41148,11 +41161,11 @@
   <p:clrMapOvr>
     <a:masterClrMapping/>
   </p:clrMapOvr>
-  <mc:AlternateContent xmlns:mc="http://schemas.openxmlformats.org/markup-compatibility/2006">
-    <mc:Choice xmlns:p14="http://schemas.microsoft.com/office/powerpoint/2010/main" Requires="p14">
+  <mc:AlternateContent xmlns:mc="http://schemas.openxmlformats.org/markup-compatibility/2006" xmlns:p14="http://schemas.microsoft.com/office/powerpoint/2010/main">
+    <mc:Choice Requires="p14">
       <p:transition p14:dur="10"/>
     </mc:Choice>
-    <mc:Fallback>
+    <mc:Fallback xmlns="">
       <p:transition/>
     </mc:Fallback>
   </mc:AlternateContent>
@@ -41192,14 +41205,10 @@
           <a:lstStyle/>
           <a:p>
             <a:r>
-              <a:rPr lang="en-US" b="1"/>
-              <a:t>The </a:t>
+              <a:rPr lang="pt-BR" sz="3600" b="1" dirty="0"/>
+              <a:t>As funções nos ajudam a formatar strings que salvamos em arquivos e bancos de dados ou exibimos para os usuários</a:t>
             </a:r>
-            <a:r>
-              <a:rPr lang="en-US" b="1" dirty="0"/>
-              <a:t>functions help us format strings we save  to files and databases, or display to users </a:t>
-            </a:r>
-            <a:endParaRPr lang="en-US" dirty="0"/>
+            <a:endParaRPr lang="en-US" sz="3600" dirty="0"/>
           </a:p>
         </p:txBody>
       </p:sp>
@@ -41225,11 +41234,19 @@
           <a:p>
             <a:r>
               <a:rPr lang="en-US" dirty="0" err="1"/>
-              <a:t>first_name</a:t>
+              <a:t>nome</a:t>
             </a:r>
             <a:r>
               <a:rPr lang="en-US" dirty="0"/>
               <a:t> = input(</a:t>
+            </a:r>
+            <a:r>
+              <a:rPr lang="en-CA" dirty="0">
+                <a:solidFill>
+                  <a:srgbClr val="C00000"/>
+                </a:solidFill>
+              </a:rPr>
+              <a:t>'</a:t>
             </a:r>
             <a:r>
               <a:rPr lang="en-US" dirty="0">
@@ -41237,7 +41254,47 @@
                   <a:srgbClr val="C00000"/>
                 </a:solidFill>
               </a:rPr>
-              <a:t>'What is your first name? '</a:t>
+              <a:t>Qual é o </a:t>
+            </a:r>
+            <a:r>
+              <a:rPr lang="en-US" dirty="0" err="1">
+                <a:solidFill>
+                  <a:srgbClr val="C00000"/>
+                </a:solidFill>
+              </a:rPr>
+              <a:t>seu</a:t>
+            </a:r>
+            <a:r>
+              <a:rPr lang="en-US" dirty="0">
+                <a:solidFill>
+                  <a:srgbClr val="C00000"/>
+                </a:solidFill>
+              </a:rPr>
+              <a:t> </a:t>
+            </a:r>
+            <a:r>
+              <a:rPr lang="en-US" dirty="0" err="1">
+                <a:solidFill>
+                  <a:srgbClr val="C00000"/>
+                </a:solidFill>
+              </a:rPr>
+              <a:t>nome</a:t>
+            </a:r>
+            <a:r>
+              <a:rPr lang="en-US" dirty="0">
+                <a:solidFill>
+                  <a:srgbClr val="C00000"/>
+                </a:solidFill>
+              </a:rPr>
+              <a:t>? </a:t>
+            </a:r>
+            <a:r>
+              <a:rPr lang="en-CA" dirty="0">
+                <a:solidFill>
+                  <a:srgbClr val="C00000"/>
+                </a:solidFill>
+              </a:rPr>
+              <a:t>'</a:t>
             </a:r>
             <a:r>
               <a:rPr lang="en-US" dirty="0">
@@ -41251,11 +41308,19 @@
           <a:p>
             <a:r>
               <a:rPr lang="en-US" dirty="0" err="1"/>
-              <a:t>last_name</a:t>
+              <a:t>sobrenome</a:t>
             </a:r>
             <a:r>
               <a:rPr lang="en-US" dirty="0"/>
               <a:t> = input(</a:t>
+            </a:r>
+            <a:r>
+              <a:rPr lang="en-CA" dirty="0">
+                <a:solidFill>
+                  <a:srgbClr val="C00000"/>
+                </a:solidFill>
+              </a:rPr>
+              <a:t>'</a:t>
             </a:r>
             <a:r>
               <a:rPr lang="en-US" dirty="0">
@@ -41263,7 +41328,39 @@
                   <a:srgbClr val="C00000"/>
                 </a:solidFill>
               </a:rPr>
-              <a:t>'What is your last name? '</a:t>
+              <a:t>Qual é o </a:t>
+            </a:r>
+            <a:r>
+              <a:rPr lang="en-US" dirty="0" err="1">
+                <a:solidFill>
+                  <a:srgbClr val="C00000"/>
+                </a:solidFill>
+              </a:rPr>
+              <a:t>seu</a:t>
+            </a:r>
+            <a:r>
+              <a:rPr lang="en-US" dirty="0">
+                <a:solidFill>
+                  <a:srgbClr val="C00000"/>
+                </a:solidFill>
+              </a:rPr>
+              <a:t> </a:t>
+            </a:r>
+            <a:r>
+              <a:rPr lang="en-US" dirty="0" err="1">
+                <a:solidFill>
+                  <a:srgbClr val="C00000"/>
+                </a:solidFill>
+              </a:rPr>
+              <a:t>sobrenome</a:t>
+            </a:r>
+            <a:r>
+              <a:rPr lang="en-US" dirty="0">
+                <a:solidFill>
+                  <a:srgbClr val="C00000"/>
+                </a:solidFill>
+              </a:rPr>
+              <a:t>? '</a:t>
             </a:r>
             <a:r>
               <a:rPr lang="en-US" dirty="0">
@@ -41280,12 +41377,28 @@
               <a:t>print (</a:t>
             </a:r>
             <a:r>
+              <a:rPr lang="en-CA" dirty="0">
+                <a:solidFill>
+                  <a:srgbClr val="C00000"/>
+                </a:solidFill>
+              </a:rPr>
+              <a:t>'</a:t>
+            </a:r>
+            <a:r>
               <a:rPr lang="en-US" dirty="0">
                 <a:solidFill>
                   <a:srgbClr val="C00000"/>
                 </a:solidFill>
               </a:rPr>
-              <a:t>'Hello '</a:t>
+              <a:t>Oi </a:t>
+            </a:r>
+            <a:r>
+              <a:rPr lang="en-CA" dirty="0">
+                <a:solidFill>
+                  <a:srgbClr val="C00000"/>
+                </a:solidFill>
+              </a:rPr>
+              <a:t>'</a:t>
             </a:r>
             <a:r>
               <a:rPr lang="en-US" dirty="0"/>
@@ -41293,7 +41406,7 @@
             </a:r>
             <a:r>
               <a:rPr lang="en-US" dirty="0" err="1"/>
-              <a:t>first_name.capitalize</a:t>
+              <a:t>nome.capitalize</a:t>
             </a:r>
             <a:r>
               <a:rPr lang="en-US" dirty="0"/>
@@ -41319,7 +41432,7 @@
             </a:r>
             <a:r>
               <a:rPr lang="en-US" dirty="0" err="1"/>
-              <a:t>last_name.capitalize</a:t>
+              <a:t>sobrenome.capitalize</a:t>
             </a:r>
             <a:r>
               <a:rPr lang="en-US" dirty="0"/>
@@ -41602,7 +41715,39 @@
                   <a:schemeClr val="bg1"/>
                 </a:solidFill>
               </a:rPr>
-              <a:t>What is your first name? SUSAN</a:t>
+              <a:t>Qual é o </a:t>
+            </a:r>
+            <a:r>
+              <a:rPr lang="en-US" dirty="0" err="1">
+                <a:solidFill>
+                  <a:schemeClr val="bg1"/>
+                </a:solidFill>
+              </a:rPr>
+              <a:t>seu</a:t>
+            </a:r>
+            <a:r>
+              <a:rPr lang="en-US" dirty="0">
+                <a:solidFill>
+                  <a:schemeClr val="bg1"/>
+                </a:solidFill>
+              </a:rPr>
+              <a:t> </a:t>
+            </a:r>
+            <a:r>
+              <a:rPr lang="en-US" dirty="0" err="1">
+                <a:solidFill>
+                  <a:schemeClr val="bg1"/>
+                </a:solidFill>
+              </a:rPr>
+              <a:t>nome</a:t>
+            </a:r>
+            <a:r>
+              <a:rPr lang="en-US" dirty="0">
+                <a:solidFill>
+                  <a:schemeClr val="bg1"/>
+                </a:solidFill>
+              </a:rPr>
+              <a:t>? SUSAN</a:t>
             </a:r>
           </a:p>
           <a:p>
@@ -41612,7 +41757,39 @@
                   <a:schemeClr val="bg1"/>
                 </a:solidFill>
               </a:rPr>
-              <a:t>What is your last name? IBACH</a:t>
+              <a:t>Qual é o </a:t>
+            </a:r>
+            <a:r>
+              <a:rPr lang="en-US" dirty="0" err="1">
+                <a:solidFill>
+                  <a:schemeClr val="bg1"/>
+                </a:solidFill>
+              </a:rPr>
+              <a:t>seu</a:t>
+            </a:r>
+            <a:r>
+              <a:rPr lang="en-US" dirty="0">
+                <a:solidFill>
+                  <a:schemeClr val="bg1"/>
+                </a:solidFill>
+              </a:rPr>
+              <a:t> </a:t>
+            </a:r>
+            <a:r>
+              <a:rPr lang="en-US" dirty="0" err="1">
+                <a:solidFill>
+                  <a:schemeClr val="bg1"/>
+                </a:solidFill>
+              </a:rPr>
+              <a:t>sobrenome</a:t>
+            </a:r>
+            <a:r>
+              <a:rPr lang="en-US" dirty="0">
+                <a:solidFill>
+                  <a:schemeClr val="bg1"/>
+                </a:solidFill>
+              </a:rPr>
+              <a:t>? IBACH</a:t>
             </a:r>
           </a:p>
           <a:p>
@@ -41622,7 +41799,7 @@
                   <a:schemeClr val="bg1"/>
                 </a:solidFill>
               </a:rPr>
-              <a:t>Hello Susan Ibach</a:t>
+              <a:t>Oi Susan Ibach</a:t>
             </a:r>
             <a:endParaRPr lang="en-CA" dirty="0"/>
           </a:p>
@@ -41638,11 +41815,11 @@
   <p:clrMapOvr>
     <a:masterClrMapping/>
   </p:clrMapOvr>
-  <mc:AlternateContent xmlns:mc="http://schemas.openxmlformats.org/markup-compatibility/2006">
-    <mc:Choice xmlns:p14="http://schemas.microsoft.com/office/powerpoint/2010/main" Requires="p14">
+  <mc:AlternateContent xmlns:mc="http://schemas.openxmlformats.org/markup-compatibility/2006" xmlns:p14="http://schemas.microsoft.com/office/powerpoint/2010/main">
+    <mc:Choice Requires="p14">
       <p:transition p14:dur="10"/>
     </mc:Choice>
-    <mc:Fallback>
+    <mc:Fallback xmlns="">
       <p:transition/>
     </mc:Fallback>
   </mc:AlternateContent>
@@ -41676,11 +41853,11 @@
   <p:clrMapOvr>
     <a:masterClrMapping/>
   </p:clrMapOvr>
-  <mc:AlternateContent xmlns:mc="http://schemas.openxmlformats.org/markup-compatibility/2006">
-    <mc:Choice xmlns:p14="http://schemas.microsoft.com/office/powerpoint/2010/main" Requires="p14">
+  <mc:AlternateContent xmlns:mc="http://schemas.openxmlformats.org/markup-compatibility/2006" xmlns:p14="http://schemas.microsoft.com/office/powerpoint/2010/main">
+    <mc:Choice Requires="p14">
       <p:transition p14:dur="10"/>
     </mc:Choice>
-    <mc:Fallback>
+    <mc:Fallback xmlns="">
       <p:transition/>
     </mc:Fallback>
   </mc:AlternateContent>
@@ -42790,12 +42967,6 @@
 </file>
 
 <file path=customXml/item1.xml><?xml version="1.0" encoding="utf-8"?>
-<Control xmlns="http://schemas.microsoft.com/VisualStudio/2011/storyboarding/control">
-  <Id Name="fb22c541-ded0-47fa-8877-83a4c2d16227" Revision="1" Stencil="7276b9ef-3953-4dce-a89b-ed85f20b8b93" StencilVersion="1.0"/>
-</Control>
-</file>
-
-<file path=customXml/item10.xml><?xml version="1.0" encoding="utf-8"?>
 <p:properties xmlns:p="http://schemas.microsoft.com/office/2006/metadata/properties" xmlns:xsi="http://www.w3.org/2001/XMLSchema-instance" xmlns:pc="http://schemas.microsoft.com/office/infopath/2007/PartnerControls">
   <documentManagement>
     <SharedWithUsers xmlns="83cd2334-221a-48c3-9034-bfd1542dfe28">
@@ -42819,55 +42990,13 @@
 </p:properties>
 </file>
 
-<file path=customXml/item11.xml><?xml version="1.0" encoding="utf-8"?>
-<?mso-contentType ?>
-<FormTemplates xmlns="http://schemas.microsoft.com/sharepoint/v3/contenttype/forms">
-  <Display>DocumentLibraryForm</Display>
-  <Edit>DocumentLibraryForm</Edit>
-  <New>DocumentLibraryForm</New>
-</FormTemplates>
-</file>
-
-<file path=customXml/item12.xml><?xml version="1.0" encoding="utf-8"?>
+<file path=customXml/item10.xml><?xml version="1.0" encoding="utf-8"?>
 <Control xmlns="http://schemas.microsoft.com/VisualStudio/2011/storyboarding/control">
   <Id Name="a2191c86-fc50-4add-948c-129f6b5a88d8" Revision="1" Stencil="7276b9ef-3953-4dce-a89b-ed85f20b8b93" StencilVersion="1.0"/>
 </Control>
 </file>
 
-<file path=customXml/item13.xml><?xml version="1.0" encoding="utf-8"?>
-<Control xmlns="http://schemas.microsoft.com/VisualStudio/2011/storyboarding/control">
-  <Id Name="d69996e1-3d61-4686-9b63-f1b855c596ab" Revision="1" Stencil="7276b9ef-3953-4dce-a89b-ed85f20b8b93" StencilVersion="1.0"/>
-</Control>
-</file>
-
-<file path=customXml/item14.xml><?xml version="1.0" encoding="utf-8"?>
-<?mso-contentType ?>
-<FormTemplates xmlns="http://schemas.microsoft.com/sharepoint/v3/contenttype/forms">
-  <Display>DocumentLibraryForm</Display>
-  <Edit>DocumentLibraryForm</Edit>
-  <New>DocumentLibraryForm</New>
-</FormTemplates>
-</file>
-
-<file path=customXml/item15.xml><?xml version="1.0" encoding="utf-8"?>
-<Control xmlns="http://schemas.microsoft.com/VisualStudio/2011/storyboarding/control">
-  <Id Name="369f9055-6b6c-48b9-9320-5df2d46c430a" Revision="1" Stencil="7276b9ef-3953-4dce-a89b-ed85f20b8b93" StencilVersion="1.0"/>
-</Control>
-</file>
-
-<file path=customXml/item16.xml><?xml version="1.0" encoding="utf-8"?>
-<Control xmlns="http://schemas.microsoft.com/VisualStudio/2011/storyboarding/control">
-  <Id Name="a2191c86-fc50-4add-948c-129f6b5a88d8" Revision="1" Stencil="7276b9ef-3953-4dce-a89b-ed85f20b8b93" StencilVersion="1.0"/>
-</Control>
-</file>
-
-<file path=customXml/item17.xml><?xml version="1.0" encoding="utf-8"?>
-<Control xmlns="http://schemas.microsoft.com/VisualStudio/2011/storyboarding/control">
-  <Id Name="a53d73d2-368b-429e-b817-1324eec1382c" Revision="1" Stencil="7276b9ef-3953-4dce-a89b-ed85f20b8b93" StencilVersion="1.0"/>
-</Control>
-</file>
-
-<file path=customXml/item18.xml><?xml version="1.0" encoding="utf-8"?>
+<file path=customXml/item11.xml><?xml version="1.0" encoding="utf-8"?>
 <p:properties xmlns:p="http://schemas.microsoft.com/office/2006/metadata/properties" xmlns:xsi="http://www.w3.org/2001/XMLSchema-instance" xmlns:pc="http://schemas.microsoft.com/office/infopath/2007/PartnerControls">
   <documentManagement>
     <SharedWithUsers xmlns="83cd2334-221a-48c3-9034-bfd1542dfe28">
@@ -42891,7 +43020,7 @@
 </p:properties>
 </file>
 
-<file path=customXml/item19.xml><?xml version="1.0" encoding="utf-8"?>
+<file path=customXml/item12.xml><?xml version="1.0" encoding="utf-8"?>
 <p:properties xmlns:p="http://schemas.microsoft.com/office/2006/metadata/properties" xmlns:xsi="http://www.w3.org/2001/XMLSchema-instance" xmlns:pc="http://schemas.microsoft.com/office/infopath/2007/PartnerControls">
   <documentManagement>
     <SharedWithUsers xmlns="83cd2334-221a-48c3-9034-bfd1542dfe28">
@@ -42915,43 +43044,7 @@
 </p:properties>
 </file>
 
-<file path=customXml/item2.xml><?xml version="1.0" encoding="utf-8"?>
-<Control xmlns="http://schemas.microsoft.com/VisualStudio/2011/storyboarding/control">
-  <Id Name="d69996e1-3d61-4686-9b63-f1b855c596ab" Revision="1" Stencil="7276b9ef-3953-4dce-a89b-ed85f20b8b93" StencilVersion="1.0"/>
-</Control>
-</file>
-
-<file path=customXml/item20.xml><?xml version="1.0" encoding="utf-8"?>
-<Control xmlns="http://schemas.microsoft.com/VisualStudio/2011/storyboarding/control">
-  <Id Name="d69996e1-3d61-4686-9b63-f1b855c596ab" Revision="1" Stencil="7276b9ef-3953-4dce-a89b-ed85f20b8b93" StencilVersion="1.0"/>
-</Control>
-</file>
-
-<file path=customXml/item21.xml><?xml version="1.0" encoding="utf-8"?>
-<p:properties xmlns:p="http://schemas.microsoft.com/office/2006/metadata/properties" xmlns:xsi="http://www.w3.org/2001/XMLSchema-instance" xmlns:pc="http://schemas.microsoft.com/office/infopath/2007/PartnerControls">
-  <documentManagement>
-    <SharedWithUsers xmlns="83cd2334-221a-48c3-9034-bfd1542dfe28">
-      <UserInfo>
-        <DisplayName>Gilad Turbahn</DisplayName>
-        <AccountId>511</AccountId>
-        <AccountType/>
-      </UserInfo>
-      <UserInfo>
-        <DisplayName>Keith Boyd</DisplayName>
-        <AccountId>993</AccountId>
-        <AccountType/>
-      </UserInfo>
-      <UserInfo>
-        <DisplayName>Christopher Harrison</DisplayName>
-        <AccountId>1176</AccountId>
-        <AccountType/>
-      </UserInfo>
-    </SharedWithUsers>
-  </documentManagement>
-</p:properties>
-</file>
-
-<file path=customXml/item22.xml><?xml version="1.0" encoding="utf-8"?>
+<file path=customXml/item13.xml><?xml version="1.0" encoding="utf-8"?>
 <?mso-contentType ?>
 <FormTemplates xmlns="http://schemas.microsoft.com/sharepoint/v3/contenttype/forms">
   <Display>DocumentLibraryForm</Display>
@@ -42960,13 +43053,7 @@
 </FormTemplates>
 </file>
 
-<file path=customXml/item23.xml><?xml version="1.0" encoding="utf-8"?>
-<Control xmlns="http://schemas.microsoft.com/VisualStudio/2011/storyboarding/control">
-  <Id Name="d69996e1-3d61-4686-9b63-f1b855c596ab" Revision="1" Stencil="7276b9ef-3953-4dce-a89b-ed85f20b8b93" StencilVersion="1.0"/>
-</Control>
-</file>
-
-<file path=customXml/item24.xml><?xml version="1.0" encoding="utf-8"?>
+<file path=customXml/item14.xml><?xml version="1.0" encoding="utf-8"?>
 <?mso-contentType ?>
 <FormTemplates xmlns="http://schemas.microsoft.com/sharepoint/v3/contenttype/forms">
   <Display>DocumentLibraryForm</Display>
@@ -42975,46 +43062,13 @@
 </FormTemplates>
 </file>
 
-<file path=customXml/item25.xml><?xml version="1.0" encoding="utf-8"?>
-<Control xmlns="http://schemas.microsoft.com/VisualStudio/2011/storyboarding/control">
-  <Id Name="a53d73d2-368b-429e-b817-1324eec1382c" Revision="1" Stencil="7276b9ef-3953-4dce-a89b-ed85f20b8b93" StencilVersion="1.0"/>
-</Control>
-</file>
-
-<file path=customXml/item26.xml><?xml version="1.0" encoding="utf-8"?>
-<Control xmlns="http://schemas.microsoft.com/VisualStudio/2011/storyboarding/control">
-  <Id Name="d69996e1-3d61-4686-9b63-f1b855c596ab" Revision="1" Stencil="7276b9ef-3953-4dce-a89b-ed85f20b8b93" StencilVersion="1.0"/>
-</Control>
-</file>
-
-<file path=customXml/item27.xml><?xml version="1.0" encoding="utf-8"?>
+<file path=customXml/item15.xml><?xml version="1.0" encoding="utf-8"?>
 <Control xmlns="http://schemas.microsoft.com/VisualStudio/2011/storyboarding/control">
   <Id Name="fb22c541-ded0-47fa-8877-83a4c2d16227" Revision="1" Stencil="7276b9ef-3953-4dce-a89b-ed85f20b8b93" StencilVersion="1.0"/>
 </Control>
 </file>
 
-<file path=customXml/item28.xml><?xml version="1.0" encoding="utf-8"?>
-<Control xmlns="http://schemas.microsoft.com/VisualStudio/2011/storyboarding/control">
-  <Id Name="a53d73d2-368b-429e-b817-1324eec1382c" Revision="1" Stencil="7276b9ef-3953-4dce-a89b-ed85f20b8b93" StencilVersion="1.0"/>
-</Control>
-</file>
-
-<file path=customXml/item29.xml><?xml version="1.0" encoding="utf-8"?>
-<?mso-contentType ?>
-<FormTemplates xmlns="http://schemas.microsoft.com/sharepoint/v3/contenttype/forms">
-  <Display>DocumentLibraryForm</Display>
-  <Edit>DocumentLibraryForm</Edit>
-  <New>DocumentLibraryForm</New>
-</FormTemplates>
-</file>
-
-<file path=customXml/item3.xml><?xml version="1.0" encoding="utf-8"?>
-<Control xmlns="http://schemas.microsoft.com/VisualStudio/2011/storyboarding/control">
-  <Id Name="a53d73d2-368b-429e-b817-1324eec1382c" Revision="1" Stencil="7276b9ef-3953-4dce-a89b-ed85f20b8b93" StencilVersion="1.0"/>
-</Control>
-</file>
-
-<file path=customXml/item30.xml><?xml version="1.0" encoding="utf-8"?>
+<file path=customXml/item16.xml><?xml version="1.0" encoding="utf-8"?>
 <ct:contentTypeSchema xmlns:ct="http://schemas.microsoft.com/office/2006/metadata/contentType" xmlns:ma="http://schemas.microsoft.com/office/2006/metadata/properties/metaAttributes" ct:_="" ma:_="" ma:contentTypeName="Document" ma:contentTypeID="0x010100674EDBEC711BD14FBA6FF5C10FEFEAC7" ma:contentTypeVersion="2" ma:contentTypeDescription="Create a new document." ma:contentTypeScope="" ma:versionID="2439c5e21841780d4f192983b535a097">
   <xsd:schema xmlns:xsd="http://www.w3.org/2001/XMLSchema" xmlns:xs="http://www.w3.org/2001/XMLSchema" xmlns:p="http://schemas.microsoft.com/office/2006/metadata/properties" xmlns:ns2="83cd2334-221a-48c3-9034-bfd1542dfe28" targetNamespace="http://schemas.microsoft.com/office/2006/metadata/properties" ma:root="true" ma:fieldsID="2bca9163d8d0b233c3086236a9289b04" ns2:_="">
     <xsd:import namespace="83cd2334-221a-48c3-9034-bfd1542dfe28"/>
@@ -43162,31 +43216,142 @@
 </ct:contentTypeSchema>
 </file>
 
-<file path=customXml/item31.xml><?xml version="1.0" encoding="utf-8"?>
+<file path=customXml/item17.xml><?xml version="1.0" encoding="utf-8"?>
 <Control xmlns="http://schemas.microsoft.com/VisualStudio/2011/storyboarding/control">
   <Id Name="369f9055-6b6c-48b9-9320-5df2d46c430a" Revision="1" Stencil="7276b9ef-3953-4dce-a89b-ed85f20b8b93" StencilVersion="1.0"/>
 </Control>
 </file>
 
-<file path=customXml/item32.xml><?xml version="1.0" encoding="utf-8"?>
-<?mso-contentType ?>
-<FormTemplates xmlns="http://schemas.microsoft.com/sharepoint/v3/contenttype/forms">
-  <Display>DocumentLibraryForm</Display>
-  <Edit>DocumentLibraryForm</Edit>
-  <New>DocumentLibraryForm</New>
-</FormTemplates>
-</file>
-
-<file path=customXml/item33.xml><?xml version="1.0" encoding="utf-8"?>
+<file path=customXml/item18.xml><?xml version="1.0" encoding="utf-8"?>
 <Control xmlns="http://schemas.microsoft.com/VisualStudio/2011/storyboarding/control">
   <Id Name="fb22c541-ded0-47fa-8877-83a4c2d16227" Revision="1" Stencil="7276b9ef-3953-4dce-a89b-ed85f20b8b93" StencilVersion="1.0"/>
 </Control>
 </file>
 
-<file path=customXml/item34.xml><?xml version="1.0" encoding="utf-8"?>
+<file path=customXml/item19.xml><?xml version="1.0" encoding="utf-8"?>
+<Control xmlns="http://schemas.microsoft.com/VisualStudio/2011/storyboarding/control">
+  <Id Name="369f9055-6b6c-48b9-9320-5df2d46c430a" Revision="1" Stencil="7276b9ef-3953-4dce-a89b-ed85f20b8b93" StencilVersion="1.0"/>
+</Control>
+</file>
+
+<file path=customXml/item2.xml><?xml version="1.0" encoding="utf-8"?>
+<Control xmlns="http://schemas.microsoft.com/VisualStudio/2011/storyboarding/control">
+  <Id Name="d69996e1-3d61-4686-9b63-f1b855c596ab" Revision="1" Stencil="7276b9ef-3953-4dce-a89b-ed85f20b8b93" StencilVersion="1.0"/>
+</Control>
+</file>
+
+<file path=customXml/item20.xml><?xml version="1.0" encoding="utf-8"?>
 <Control xmlns="http://schemas.microsoft.com/VisualStudio/2011/storyboarding/control">
   <Id Name="a53d73d2-368b-429e-b817-1324eec1382c" Revision="1" Stencil="7276b9ef-3953-4dce-a89b-ed85f20b8b93" StencilVersion="1.0"/>
 </Control>
+</file>
+
+<file path=customXml/item21.xml><?xml version="1.0" encoding="utf-8"?>
+<Control xmlns="http://schemas.microsoft.com/VisualStudio/2011/storyboarding/control">
+  <Id Name="a2191c86-fc50-4add-948c-129f6b5a88d8" Revision="1" Stencil="7276b9ef-3953-4dce-a89b-ed85f20b8b93" StencilVersion="1.0"/>
+</Control>
+</file>
+
+<file path=customXml/item22.xml><?xml version="1.0" encoding="utf-8"?>
+<Control xmlns="http://schemas.microsoft.com/VisualStudio/2011/storyboarding/control">
+  <Id Name="a53d73d2-368b-429e-b817-1324eec1382c" Revision="1" Stencil="7276b9ef-3953-4dce-a89b-ed85f20b8b93" StencilVersion="1.0"/>
+</Control>
+</file>
+
+<file path=customXml/item23.xml><?xml version="1.0" encoding="utf-8"?>
+<Control xmlns="http://schemas.microsoft.com/VisualStudio/2011/storyboarding/control">
+  <Id Name="a53d73d2-368b-429e-b817-1324eec1382c" Revision="1" Stencil="7276b9ef-3953-4dce-a89b-ed85f20b8b93" StencilVersion="1.0"/>
+</Control>
+</file>
+
+<file path=customXml/item24.xml><?xml version="1.0" encoding="utf-8"?>
+<Control xmlns="http://schemas.microsoft.com/VisualStudio/2011/storyboarding/control">
+  <Id Name="fb22c541-ded0-47fa-8877-83a4c2d16227" Revision="1" Stencil="7276b9ef-3953-4dce-a89b-ed85f20b8b93" StencilVersion="1.0"/>
+</Control>
+</file>
+
+<file path=customXml/item25.xml><?xml version="1.0" encoding="utf-8"?>
+<Control xmlns="http://schemas.microsoft.com/VisualStudio/2011/storyboarding/control">
+  <Id Name="fb22c541-ded0-47fa-8877-83a4c2d16227" Revision="1" Stencil="7276b9ef-3953-4dce-a89b-ed85f20b8b93" StencilVersion="1.0"/>
+</Control>
+</file>
+
+<file path=customXml/item26.xml><?xml version="1.0" encoding="utf-8"?>
+<Control xmlns="http://schemas.microsoft.com/VisualStudio/2011/storyboarding/control">
+  <Id Name="d69996e1-3d61-4686-9b63-f1b855c596ab" Revision="1" Stencil="7276b9ef-3953-4dce-a89b-ed85f20b8b93" StencilVersion="1.0"/>
+</Control>
+</file>
+
+<file path=customXml/item27.xml><?xml version="1.0" encoding="utf-8"?>
+<Control xmlns="http://schemas.microsoft.com/VisualStudio/2011/storyboarding/control">
+  <Id Name="a2191c86-fc50-4add-948c-129f6b5a88d8" Revision="1" Stencil="7276b9ef-3953-4dce-a89b-ed85f20b8b93" StencilVersion="1.0"/>
+</Control>
+</file>
+
+<file path=customXml/item28.xml><?xml version="1.0" encoding="utf-8"?>
+<Control xmlns="http://schemas.microsoft.com/VisualStudio/2011/storyboarding/control">
+  <Id Name="fb22c541-ded0-47fa-8877-83a4c2d16227" Revision="1" Stencil="7276b9ef-3953-4dce-a89b-ed85f20b8b93" StencilVersion="1.0"/>
+</Control>
+</file>
+
+<file path=customXml/item29.xml><?xml version="1.0" encoding="utf-8"?>
+<Control xmlns="http://schemas.microsoft.com/VisualStudio/2011/storyboarding/control">
+  <Id Name="369f9055-6b6c-48b9-9320-5df2d46c430a" Revision="1" Stencil="7276b9ef-3953-4dce-a89b-ed85f20b8b93" StencilVersion="1.0"/>
+</Control>
+</file>
+
+<file path=customXml/item3.xml><?xml version="1.0" encoding="utf-8"?>
+<Control xmlns="http://schemas.microsoft.com/VisualStudio/2011/storyboarding/control">
+  <Id Name="a2191c86-fc50-4add-948c-129f6b5a88d8" Revision="1" Stencil="7276b9ef-3953-4dce-a89b-ed85f20b8b93" StencilVersion="1.0"/>
+</Control>
+</file>
+
+<file path=customXml/item30.xml><?xml version="1.0" encoding="utf-8"?>
+<Control xmlns="http://schemas.microsoft.com/VisualStudio/2011/storyboarding/control">
+  <Id Name="369f9055-6b6c-48b9-9320-5df2d46c430a" Revision="1" Stencil="7276b9ef-3953-4dce-a89b-ed85f20b8b93" StencilVersion="1.0"/>
+</Control>
+</file>
+
+<file path=customXml/item31.xml><?xml version="1.0" encoding="utf-8"?>
+<Control xmlns="http://schemas.microsoft.com/VisualStudio/2011/storyboarding/control">
+  <Id Name="d69996e1-3d61-4686-9b63-f1b855c596ab" Revision="1" Stencil="7276b9ef-3953-4dce-a89b-ed85f20b8b93" StencilVersion="1.0"/>
+</Control>
+</file>
+
+<file path=customXml/item32.xml><?xml version="1.0" encoding="utf-8"?>
+<Control xmlns="http://schemas.microsoft.com/VisualStudio/2011/storyboarding/control">
+  <Id Name="a53d73d2-368b-429e-b817-1324eec1382c" Revision="1" Stencil="7276b9ef-3953-4dce-a89b-ed85f20b8b93" StencilVersion="1.0"/>
+</Control>
+</file>
+
+<file path=customXml/item33.xml><?xml version="1.0" encoding="utf-8"?>
+<Control xmlns="http://schemas.microsoft.com/VisualStudio/2011/storyboarding/control">
+  <Id Name="a53d73d2-368b-429e-b817-1324eec1382c" Revision="1" Stencil="7276b9ef-3953-4dce-a89b-ed85f20b8b93" StencilVersion="1.0"/>
+</Control>
+</file>
+
+<file path=customXml/item34.xml><?xml version="1.0" encoding="utf-8"?>
+<p:properties xmlns:p="http://schemas.microsoft.com/office/2006/metadata/properties" xmlns:xsi="http://www.w3.org/2001/XMLSchema-instance" xmlns:pc="http://schemas.microsoft.com/office/infopath/2007/PartnerControls">
+  <documentManagement>
+    <SharedWithUsers xmlns="83cd2334-221a-48c3-9034-bfd1542dfe28">
+      <UserInfo>
+        <DisplayName>Gilad Turbahn</DisplayName>
+        <AccountId>511</AccountId>
+        <AccountType/>
+      </UserInfo>
+      <UserInfo>
+        <DisplayName>Keith Boyd</DisplayName>
+        <AccountId>993</AccountId>
+        <AccountType/>
+      </UserInfo>
+      <UserInfo>
+        <DisplayName>Christopher Harrison</DisplayName>
+        <AccountId>1176</AccountId>
+        <AccountType/>
+      </UserInfo>
+    </SharedWithUsers>
+  </documentManagement>
+</p:properties>
 </file>
 
 <file path=customXml/item35.xml><?xml version="1.0" encoding="utf-8"?>
@@ -43197,14 +43362,17 @@
 
 <file path=customXml/item36.xml><?xml version="1.0" encoding="utf-8"?>
 <Control xmlns="http://schemas.microsoft.com/VisualStudio/2011/storyboarding/control">
-  <Id Name="a53d73d2-368b-429e-b817-1324eec1382c" Revision="1" Stencil="7276b9ef-3953-4dce-a89b-ed85f20b8b93" StencilVersion="1.0"/>
+  <Id Name="a2191c86-fc50-4add-948c-129f6b5a88d8" Revision="1" Stencil="7276b9ef-3953-4dce-a89b-ed85f20b8b93" StencilVersion="1.0"/>
 </Control>
 </file>
 
 <file path=customXml/item37.xml><?xml version="1.0" encoding="utf-8"?>
-<Control xmlns="http://schemas.microsoft.com/VisualStudio/2011/storyboarding/control">
-  <Id Name="369f9055-6b6c-48b9-9320-5df2d46c430a" Revision="1" Stencil="7276b9ef-3953-4dce-a89b-ed85f20b8b93" StencilVersion="1.0"/>
-</Control>
+<?mso-contentType ?>
+<FormTemplates xmlns="http://schemas.microsoft.com/sharepoint/v3/contenttype/forms">
+  <Display>DocumentLibraryForm</Display>
+  <Edit>DocumentLibraryForm</Edit>
+  <New>DocumentLibraryForm</New>
+</FormTemplates>
 </file>
 
 <file path=customXml/item38.xml><?xml version="1.0" encoding="utf-8"?>
@@ -43215,7 +43383,7 @@
 
 <file path=customXml/item39.xml><?xml version="1.0" encoding="utf-8"?>
 <Control xmlns="http://schemas.microsoft.com/VisualStudio/2011/storyboarding/control">
-  <Id Name="a2191c86-fc50-4add-948c-129f6b5a88d8" Revision="1" Stencil="7276b9ef-3953-4dce-a89b-ed85f20b8b93" StencilVersion="1.0"/>
+  <Id Name="d69996e1-3d61-4686-9b63-f1b855c596ab" Revision="1" Stencil="7276b9ef-3953-4dce-a89b-ed85f20b8b93" StencilVersion="1.0"/>
 </Control>
 </file>
 
@@ -43254,35 +43422,17 @@
 
 <file path=customXml/item41.xml><?xml version="1.0" encoding="utf-8"?>
 <Control xmlns="http://schemas.microsoft.com/VisualStudio/2011/storyboarding/control">
-  <Id Name="a2191c86-fc50-4add-948c-129f6b5a88d8" Revision="1" Stencil="7276b9ef-3953-4dce-a89b-ed85f20b8b93" StencilVersion="1.0"/>
+  <Id Name="d69996e1-3d61-4686-9b63-f1b855c596ab" Revision="1" Stencil="7276b9ef-3953-4dce-a89b-ed85f20b8b93" StencilVersion="1.0"/>
 </Control>
 </file>
 
 <file path=customXml/item42.xml><?xml version="1.0" encoding="utf-8"?>
 <Control xmlns="http://schemas.microsoft.com/VisualStudio/2011/storyboarding/control">
-  <Id Name="d69996e1-3d61-4686-9b63-f1b855c596ab" Revision="1" Stencil="7276b9ef-3953-4dce-a89b-ed85f20b8b93" StencilVersion="1.0"/>
+  <Id Name="a2191c86-fc50-4add-948c-129f6b5a88d8" Revision="1" Stencil="7276b9ef-3953-4dce-a89b-ed85f20b8b93" StencilVersion="1.0"/>
 </Control>
 </file>
 
 <file path=customXml/item43.xml><?xml version="1.0" encoding="utf-8"?>
-<Control xmlns="http://schemas.microsoft.com/VisualStudio/2011/storyboarding/control">
-  <Id Name="fb22c541-ded0-47fa-8877-83a4c2d16227" Revision="1" Stencil="7276b9ef-3953-4dce-a89b-ed85f20b8b93" StencilVersion="1.0"/>
-</Control>
-</file>
-
-<file path=customXml/item44.xml><?xml version="1.0" encoding="utf-8"?>
-<Control xmlns="http://schemas.microsoft.com/VisualStudio/2011/storyboarding/control">
-  <Id Name="a2191c86-fc50-4add-948c-129f6b5a88d8" Revision="1" Stencil="7276b9ef-3953-4dce-a89b-ed85f20b8b93" StencilVersion="1.0"/>
-</Control>
-</file>
-
-<file path=customXml/item45.xml><?xml version="1.0" encoding="utf-8"?>
-<Control xmlns="http://schemas.microsoft.com/VisualStudio/2011/storyboarding/control">
-  <Id Name="a2191c86-fc50-4add-948c-129f6b5a88d8" Revision="1" Stencil="7276b9ef-3953-4dce-a89b-ed85f20b8b93" StencilVersion="1.0"/>
-</Control>
-</file>
-
-<file path=customXml/item5.xml><?xml version="1.0" encoding="utf-8"?>
 <p:properties xmlns:p="http://schemas.microsoft.com/office/2006/metadata/properties" xmlns:xsi="http://www.w3.org/2001/XMLSchema-instance" xmlns:pc="http://schemas.microsoft.com/office/infopath/2007/PartnerControls">
   <documentManagement>
     <SharedWithUsers xmlns="83cd2334-221a-48c3-9034-bfd1542dfe28">
@@ -43306,13 +43456,52 @@
 </p:properties>
 </file>
 
+<file path=customXml/item44.xml><?xml version="1.0" encoding="utf-8"?>
+<Control xmlns="http://schemas.microsoft.com/VisualStudio/2011/storyboarding/control">
+  <Id Name="a53d73d2-368b-429e-b817-1324eec1382c" Revision="1" Stencil="7276b9ef-3953-4dce-a89b-ed85f20b8b93" StencilVersion="1.0"/>
+</Control>
+</file>
+
+<file path=customXml/item45.xml><?xml version="1.0" encoding="utf-8"?>
+<Control xmlns="http://schemas.microsoft.com/VisualStudio/2011/storyboarding/control">
+  <Id Name="d69996e1-3d61-4686-9b63-f1b855c596ab" Revision="1" Stencil="7276b9ef-3953-4dce-a89b-ed85f20b8b93" StencilVersion="1.0"/>
+</Control>
+</file>
+
+<file path=customXml/item5.xml><?xml version="1.0" encoding="utf-8"?>
+<?mso-contentType ?>
+<FormTemplates xmlns="http://schemas.microsoft.com/sharepoint/v3/contenttype/forms">
+  <Display>DocumentLibraryForm</Display>
+  <Edit>DocumentLibraryForm</Edit>
+  <New>DocumentLibraryForm</New>
+</FormTemplates>
+</file>
+
 <file path=customXml/item6.xml><?xml version="1.0" encoding="utf-8"?>
+<?mso-contentType ?>
+<FormTemplates xmlns="http://schemas.microsoft.com/sharepoint/v3/contenttype/forms">
+  <Display>DocumentLibraryForm</Display>
+  <Edit>DocumentLibraryForm</Edit>
+  <New>DocumentLibraryForm</New>
+</FormTemplates>
+</file>
+
+<file path=customXml/item7.xml><?xml version="1.0" encoding="utf-8"?>
+<?mso-contentType ?>
+<FormTemplates xmlns="http://schemas.microsoft.com/sharepoint/v3/contenttype/forms">
+  <Display>DocumentLibraryForm</Display>
+  <Edit>DocumentLibraryForm</Edit>
+  <New>DocumentLibraryForm</New>
+</FormTemplates>
+</file>
+
+<file path=customXml/item8.xml><?xml version="1.0" encoding="utf-8"?>
 <Control xmlns="http://schemas.microsoft.com/VisualStudio/2011/storyboarding/control">
   <Id Name="369f9055-6b6c-48b9-9320-5df2d46c430a" Revision="1" Stencil="7276b9ef-3953-4dce-a89b-ed85f20b8b93" StencilVersion="1.0"/>
 </Control>
 </file>
 
-<file path=customXml/item7.xml><?xml version="1.0" encoding="utf-8"?>
+<file path=customXml/item9.xml><?xml version="1.0" encoding="utf-8"?>
 <p:properties xmlns:p="http://schemas.microsoft.com/office/2006/metadata/properties" xmlns:xsi="http://www.w3.org/2001/XMLSchema-instance" xmlns:pc="http://schemas.microsoft.com/office/infopath/2007/PartnerControls">
   <documentManagement>
     <SharedWithUsers xmlns="83cd2334-221a-48c3-9034-bfd1542dfe28">
@@ -43336,28 +43525,8 @@
 </p:properties>
 </file>
 
-<file path=customXml/item8.xml><?xml version="1.0" encoding="utf-8"?>
-<Control xmlns="http://schemas.microsoft.com/VisualStudio/2011/storyboarding/control">
-  <Id Name="369f9055-6b6c-48b9-9320-5df2d46c430a" Revision="1" Stencil="7276b9ef-3953-4dce-a89b-ed85f20b8b93" StencilVersion="1.0"/>
-</Control>
-</file>
-
-<file path=customXml/item9.xml><?xml version="1.0" encoding="utf-8"?>
-<Control xmlns="http://schemas.microsoft.com/VisualStudio/2011/storyboarding/control">
-  <Id Name="fb22c541-ded0-47fa-8877-83a4c2d16227" Revision="1" Stencil="7276b9ef-3953-4dce-a89b-ed85f20b8b93" StencilVersion="1.0"/>
-</Control>
-</file>
-
 <file path=customXml/itemProps1.xml><?xml version="1.0" encoding="utf-8"?>
-<ds:datastoreItem xmlns:ds="http://schemas.openxmlformats.org/officeDocument/2006/customXml" ds:itemID="{4C1B3C27-4803-4D72-A3F8-6668A3F0A24B}">
-  <ds:schemaRefs>
-    <ds:schemaRef ds:uri="http://schemas.microsoft.com/VisualStudio/2011/storyboarding/control"/>
-  </ds:schemaRefs>
-</ds:datastoreItem>
-</file>
-
-<file path=customXml/itemProps10.xml><?xml version="1.0" encoding="utf-8"?>
-<ds:datastoreItem xmlns:ds="http://schemas.openxmlformats.org/officeDocument/2006/customXml" ds:itemID="{F990F116-B58F-4255-B05B-DA3808E0E5C6}">
+<ds:datastoreItem xmlns:ds="http://schemas.openxmlformats.org/officeDocument/2006/customXml" ds:itemID="{B18102BA-C10B-41D1-8610-3D321D638DD2}">
   <ds:schemaRefs>
     <ds:schemaRef ds:uri="http://schemas.microsoft.com/office/2006/metadata/properties"/>
     <ds:schemaRef ds:uri="http://schemas.microsoft.com/office/infopath/2007/PartnerControls"/>
@@ -43366,64 +43535,16 @@
 </ds:datastoreItem>
 </file>
 
-<file path=customXml/itemProps11.xml><?xml version="1.0" encoding="utf-8"?>
-<ds:datastoreItem xmlns:ds="http://schemas.openxmlformats.org/officeDocument/2006/customXml" ds:itemID="{1EF25EC2-965B-4491-9691-6B806C9E3B8B}">
-  <ds:schemaRefs>
-    <ds:schemaRef ds:uri="http://schemas.microsoft.com/sharepoint/v3/contenttype/forms"/>
-  </ds:schemaRefs>
-</ds:datastoreItem>
-</file>
-
-<file path=customXml/itemProps12.xml><?xml version="1.0" encoding="utf-8"?>
-<ds:datastoreItem xmlns:ds="http://schemas.openxmlformats.org/officeDocument/2006/customXml" ds:itemID="{3C954CC5-1CAC-4EC3-9791-8630483065B9}">
+<file path=customXml/itemProps10.xml><?xml version="1.0" encoding="utf-8"?>
+<ds:datastoreItem xmlns:ds="http://schemas.openxmlformats.org/officeDocument/2006/customXml" ds:itemID="{0B54C583-7BAB-4080-8093-C5F84F5A225A}">
   <ds:schemaRefs>
     <ds:schemaRef ds:uri="http://schemas.microsoft.com/VisualStudio/2011/storyboarding/control"/>
   </ds:schemaRefs>
 </ds:datastoreItem>
 </file>
 
-<file path=customXml/itemProps13.xml><?xml version="1.0" encoding="utf-8"?>
-<ds:datastoreItem xmlns:ds="http://schemas.openxmlformats.org/officeDocument/2006/customXml" ds:itemID="{3DC6CABD-46E1-4C27-A0B3-616DC56F8E5C}">
-  <ds:schemaRefs>
-    <ds:schemaRef ds:uri="http://schemas.microsoft.com/VisualStudio/2011/storyboarding/control"/>
-  </ds:schemaRefs>
-</ds:datastoreItem>
-</file>
-
-<file path=customXml/itemProps14.xml><?xml version="1.0" encoding="utf-8"?>
-<ds:datastoreItem xmlns:ds="http://schemas.openxmlformats.org/officeDocument/2006/customXml" ds:itemID="{8E7D1C6F-2F1C-4FF7-8E81-B00199180E81}">
-  <ds:schemaRefs>
-    <ds:schemaRef ds:uri="http://schemas.microsoft.com/sharepoint/v3/contenttype/forms"/>
-  </ds:schemaRefs>
-</ds:datastoreItem>
-</file>
-
-<file path=customXml/itemProps15.xml><?xml version="1.0" encoding="utf-8"?>
-<ds:datastoreItem xmlns:ds="http://schemas.openxmlformats.org/officeDocument/2006/customXml" ds:itemID="{08C4EE12-DF69-4FFC-9E40-C7991F3490A6}">
-  <ds:schemaRefs>
-    <ds:schemaRef ds:uri="http://schemas.microsoft.com/VisualStudio/2011/storyboarding/control"/>
-  </ds:schemaRefs>
-</ds:datastoreItem>
-</file>
-
-<file path=customXml/itemProps16.xml><?xml version="1.0" encoding="utf-8"?>
-<ds:datastoreItem xmlns:ds="http://schemas.openxmlformats.org/officeDocument/2006/customXml" ds:itemID="{8BD595CA-AC5E-43B9-B966-E468A16E8322}">
-  <ds:schemaRefs>
-    <ds:schemaRef ds:uri="http://schemas.microsoft.com/VisualStudio/2011/storyboarding/control"/>
-  </ds:schemaRefs>
-</ds:datastoreItem>
-</file>
-
-<file path=customXml/itemProps17.xml><?xml version="1.0" encoding="utf-8"?>
-<ds:datastoreItem xmlns:ds="http://schemas.openxmlformats.org/officeDocument/2006/customXml" ds:itemID="{ED350DFE-2319-4AB0-BC96-1D36D125365A}">
-  <ds:schemaRefs>
-    <ds:schemaRef ds:uri="http://schemas.microsoft.com/VisualStudio/2011/storyboarding/control"/>
-  </ds:schemaRefs>
-</ds:datastoreItem>
-</file>
-
-<file path=customXml/itemProps18.xml><?xml version="1.0" encoding="utf-8"?>
-<ds:datastoreItem xmlns:ds="http://schemas.openxmlformats.org/officeDocument/2006/customXml" ds:itemID="{E692D73E-1478-4790-BEEC-C5C534998F40}">
+<file path=customXml/itemProps11.xml><?xml version="1.0" encoding="utf-8"?>
+<ds:datastoreItem xmlns:ds="http://schemas.openxmlformats.org/officeDocument/2006/customXml" ds:itemID="{ED3B47FC-4A86-4462-9CF5-F495504794E8}">
   <ds:schemaRefs>
     <ds:schemaRef ds:uri="http://schemas.microsoft.com/office/2006/metadata/properties"/>
     <ds:schemaRef ds:uri="http://schemas.microsoft.com/office/infopath/2007/PartnerControls"/>
@@ -43432,7 +43553,7 @@
 </ds:datastoreItem>
 </file>
 
-<file path=customXml/itemProps19.xml><?xml version="1.0" encoding="utf-8"?>
+<file path=customXml/itemProps12.xml><?xml version="1.0" encoding="utf-8"?>
 <ds:datastoreItem xmlns:ds="http://schemas.openxmlformats.org/officeDocument/2006/customXml" ds:itemID="{1C76383C-FD09-474B-94B3-126FB1A7D094}">
   <ds:schemaRefs>
     <ds:schemaRef ds:uri="http://schemas.microsoft.com/office/2006/metadata/properties"/>
@@ -43442,33 +43563,15 @@
 </ds:datastoreItem>
 </file>
 
-<file path=customXml/itemProps2.xml><?xml version="1.0" encoding="utf-8"?>
-<ds:datastoreItem xmlns:ds="http://schemas.openxmlformats.org/officeDocument/2006/customXml" ds:itemID="{67213E6F-7B96-4222-888B-63710B06D885}">
+<file path=customXml/itemProps13.xml><?xml version="1.0" encoding="utf-8"?>
+<ds:datastoreItem xmlns:ds="http://schemas.openxmlformats.org/officeDocument/2006/customXml" ds:itemID="{8E7D1C6F-2F1C-4FF7-8E81-B00199180E81}">
   <ds:schemaRefs>
-    <ds:schemaRef ds:uri="http://schemas.microsoft.com/VisualStudio/2011/storyboarding/control"/>
+    <ds:schemaRef ds:uri="http://schemas.microsoft.com/sharepoint/v3/contenttype/forms"/>
   </ds:schemaRefs>
 </ds:datastoreItem>
 </file>
 
-<file path=customXml/itemProps20.xml><?xml version="1.0" encoding="utf-8"?>
-<ds:datastoreItem xmlns:ds="http://schemas.openxmlformats.org/officeDocument/2006/customXml" ds:itemID="{366CA990-F93D-4100-9654-65D9E30F4E1C}">
-  <ds:schemaRefs>
-    <ds:schemaRef ds:uri="http://schemas.microsoft.com/VisualStudio/2011/storyboarding/control"/>
-  </ds:schemaRefs>
-</ds:datastoreItem>
-</file>
-
-<file path=customXml/itemProps21.xml><?xml version="1.0" encoding="utf-8"?>
-<ds:datastoreItem xmlns:ds="http://schemas.openxmlformats.org/officeDocument/2006/customXml" ds:itemID="{473A6A21-7521-4B81-9336-9B587BA12275}">
-  <ds:schemaRefs>
-    <ds:schemaRef ds:uri="http://schemas.microsoft.com/office/2006/metadata/properties"/>
-    <ds:schemaRef ds:uri="http://schemas.microsoft.com/office/infopath/2007/PartnerControls"/>
-    <ds:schemaRef ds:uri="83cd2334-221a-48c3-9034-bfd1542dfe28"/>
-  </ds:schemaRefs>
-</ds:datastoreItem>
-</file>
-
-<file path=customXml/itemProps22.xml><?xml version="1.0" encoding="utf-8"?>
+<file path=customXml/itemProps14.xml><?xml version="1.0" encoding="utf-8"?>
 <ds:datastoreItem xmlns:ds="http://schemas.openxmlformats.org/officeDocument/2006/customXml" ds:itemID="{470353D1-3545-4BE2-A17C-548BF46AD9BC}">
   <ds:schemaRefs>
     <ds:schemaRef ds:uri="http://schemas.microsoft.com/sharepoint/v3/contenttype/forms"/>
@@ -43476,39 +43579,7 @@
 </ds:datastoreItem>
 </file>
 
-<file path=customXml/itemProps23.xml><?xml version="1.0" encoding="utf-8"?>
-<ds:datastoreItem xmlns:ds="http://schemas.openxmlformats.org/officeDocument/2006/customXml" ds:itemID="{C63AC2F0-1DEB-4E91-A88A-7A014A172F4F}">
-  <ds:schemaRefs>
-    <ds:schemaRef ds:uri="http://schemas.microsoft.com/VisualStudio/2011/storyboarding/control"/>
-  </ds:schemaRefs>
-</ds:datastoreItem>
-</file>
-
-<file path=customXml/itemProps24.xml><?xml version="1.0" encoding="utf-8"?>
-<ds:datastoreItem xmlns:ds="http://schemas.openxmlformats.org/officeDocument/2006/customXml" ds:itemID="{689260D6-B6B3-49EB-B7BA-F472BA6A8BA1}">
-  <ds:schemaRefs>
-    <ds:schemaRef ds:uri="http://schemas.microsoft.com/sharepoint/v3/contenttype/forms"/>
-  </ds:schemaRefs>
-</ds:datastoreItem>
-</file>
-
-<file path=customXml/itemProps25.xml><?xml version="1.0" encoding="utf-8"?>
-<ds:datastoreItem xmlns:ds="http://schemas.openxmlformats.org/officeDocument/2006/customXml" ds:itemID="{8893E80D-6D0C-4E0F-AA22-E5615BB87E5B}">
-  <ds:schemaRefs>
-    <ds:schemaRef ds:uri="http://schemas.microsoft.com/VisualStudio/2011/storyboarding/control"/>
-  </ds:schemaRefs>
-</ds:datastoreItem>
-</file>
-
-<file path=customXml/itemProps26.xml><?xml version="1.0" encoding="utf-8"?>
-<ds:datastoreItem xmlns:ds="http://schemas.openxmlformats.org/officeDocument/2006/customXml" ds:itemID="{0282FB20-2D4C-459D-8468-77D1D3C6925D}">
-  <ds:schemaRefs>
-    <ds:schemaRef ds:uri="http://schemas.microsoft.com/VisualStudio/2011/storyboarding/control"/>
-  </ds:schemaRefs>
-</ds:datastoreItem>
-</file>
-
-<file path=customXml/itemProps27.xml><?xml version="1.0" encoding="utf-8"?>
+<file path=customXml/itemProps15.xml><?xml version="1.0" encoding="utf-8"?>
 <ds:datastoreItem xmlns:ds="http://schemas.openxmlformats.org/officeDocument/2006/customXml" ds:itemID="{376216F9-AF6B-4844-AE8C-B9F953F916AB}">
   <ds:schemaRefs>
     <ds:schemaRef ds:uri="http://schemas.microsoft.com/VisualStudio/2011/storyboarding/control"/>
@@ -43516,31 +43587,7 @@
 </ds:datastoreItem>
 </file>
 
-<file path=customXml/itemProps28.xml><?xml version="1.0" encoding="utf-8"?>
-<ds:datastoreItem xmlns:ds="http://schemas.openxmlformats.org/officeDocument/2006/customXml" ds:itemID="{F68D8396-E21C-4AFF-8FDD-70D00673D0EE}">
-  <ds:schemaRefs>
-    <ds:schemaRef ds:uri="http://schemas.microsoft.com/VisualStudio/2011/storyboarding/control"/>
-  </ds:schemaRefs>
-</ds:datastoreItem>
-</file>
-
-<file path=customXml/itemProps29.xml><?xml version="1.0" encoding="utf-8"?>
-<ds:datastoreItem xmlns:ds="http://schemas.openxmlformats.org/officeDocument/2006/customXml" ds:itemID="{9360AFB9-8F99-4E1B-878D-F2EBABEB164C}">
-  <ds:schemaRefs>
-    <ds:schemaRef ds:uri="http://schemas.microsoft.com/sharepoint/v3/contenttype/forms"/>
-  </ds:schemaRefs>
-</ds:datastoreItem>
-</file>
-
-<file path=customXml/itemProps3.xml><?xml version="1.0" encoding="utf-8"?>
-<ds:datastoreItem xmlns:ds="http://schemas.openxmlformats.org/officeDocument/2006/customXml" ds:itemID="{21F6B647-976A-41D0-B760-9DF9DFC6AE3C}">
-  <ds:schemaRefs>
-    <ds:schemaRef ds:uri="http://schemas.microsoft.com/VisualStudio/2011/storyboarding/control"/>
-  </ds:schemaRefs>
-</ds:datastoreItem>
-</file>
-
-<file path=customXml/itemProps30.xml><?xml version="1.0" encoding="utf-8"?>
+<file path=customXml/itemProps16.xml><?xml version="1.0" encoding="utf-8"?>
 <ds:datastoreItem xmlns:ds="http://schemas.openxmlformats.org/officeDocument/2006/customXml" ds:itemID="{11F98F69-7518-4AE2-AE7B-E037DC9DDC97}">
   <ds:schemaRefs>
     <ds:schemaRef ds:uri="http://schemas.microsoft.com/office/2006/metadata/contentType"/>
@@ -43558,7 +43605,169 @@
 </ds:datastoreItem>
 </file>
 
+<file path=customXml/itemProps17.xml><?xml version="1.0" encoding="utf-8"?>
+<ds:datastoreItem xmlns:ds="http://schemas.openxmlformats.org/officeDocument/2006/customXml" ds:itemID="{FE651ABA-5DC1-4ABD-A06E-055AE54B337B}">
+  <ds:schemaRefs>
+    <ds:schemaRef ds:uri="http://schemas.microsoft.com/VisualStudio/2011/storyboarding/control"/>
+  </ds:schemaRefs>
+</ds:datastoreItem>
+</file>
+
+<file path=customXml/itemProps18.xml><?xml version="1.0" encoding="utf-8"?>
+<ds:datastoreItem xmlns:ds="http://schemas.openxmlformats.org/officeDocument/2006/customXml" ds:itemID="{B5105A87-47B6-44F6-97FD-4619C0556604}">
+  <ds:schemaRefs>
+    <ds:schemaRef ds:uri="http://schemas.microsoft.com/VisualStudio/2011/storyboarding/control"/>
+  </ds:schemaRefs>
+</ds:datastoreItem>
+</file>
+
+<file path=customXml/itemProps19.xml><?xml version="1.0" encoding="utf-8"?>
+<ds:datastoreItem xmlns:ds="http://schemas.openxmlformats.org/officeDocument/2006/customXml" ds:itemID="{7959CC6A-F423-4783-B968-3BCC86A7394E}">
+  <ds:schemaRefs>
+    <ds:schemaRef ds:uri="http://schemas.microsoft.com/VisualStudio/2011/storyboarding/control"/>
+  </ds:schemaRefs>
+</ds:datastoreItem>
+</file>
+
+<file path=customXml/itemProps2.xml><?xml version="1.0" encoding="utf-8"?>
+<ds:datastoreItem xmlns:ds="http://schemas.openxmlformats.org/officeDocument/2006/customXml" ds:itemID="{67213E6F-7B96-4222-888B-63710B06D885}">
+  <ds:schemaRefs>
+    <ds:schemaRef ds:uri="http://schemas.microsoft.com/VisualStudio/2011/storyboarding/control"/>
+  </ds:schemaRefs>
+</ds:datastoreItem>
+</file>
+
+<file path=customXml/itemProps20.xml><?xml version="1.0" encoding="utf-8"?>
+<ds:datastoreItem xmlns:ds="http://schemas.openxmlformats.org/officeDocument/2006/customXml" ds:itemID="{21F6B647-976A-41D0-B760-9DF9DFC6AE3C}">
+  <ds:schemaRefs>
+    <ds:schemaRef ds:uri="http://schemas.microsoft.com/VisualStudio/2011/storyboarding/control"/>
+  </ds:schemaRefs>
+</ds:datastoreItem>
+</file>
+
+<file path=customXml/itemProps21.xml><?xml version="1.0" encoding="utf-8"?>
+<ds:datastoreItem xmlns:ds="http://schemas.openxmlformats.org/officeDocument/2006/customXml" ds:itemID="{3C954CC5-1CAC-4EC3-9791-8630483065B9}">
+  <ds:schemaRefs>
+    <ds:schemaRef ds:uri="http://schemas.microsoft.com/VisualStudio/2011/storyboarding/control"/>
+  </ds:schemaRefs>
+</ds:datastoreItem>
+</file>
+
+<file path=customXml/itemProps22.xml><?xml version="1.0" encoding="utf-8"?>
+<ds:datastoreItem xmlns:ds="http://schemas.openxmlformats.org/officeDocument/2006/customXml" ds:itemID="{ED350DFE-2319-4AB0-BC96-1D36D125365A}">
+  <ds:schemaRefs>
+    <ds:schemaRef ds:uri="http://schemas.microsoft.com/VisualStudio/2011/storyboarding/control"/>
+  </ds:schemaRefs>
+</ds:datastoreItem>
+</file>
+
+<file path=customXml/itemProps23.xml><?xml version="1.0" encoding="utf-8"?>
+<ds:datastoreItem xmlns:ds="http://schemas.openxmlformats.org/officeDocument/2006/customXml" ds:itemID="{8893E80D-6D0C-4E0F-AA22-E5615BB87E5B}">
+  <ds:schemaRefs>
+    <ds:schemaRef ds:uri="http://schemas.microsoft.com/VisualStudio/2011/storyboarding/control"/>
+  </ds:schemaRefs>
+</ds:datastoreItem>
+</file>
+
+<file path=customXml/itemProps24.xml><?xml version="1.0" encoding="utf-8"?>
+<ds:datastoreItem xmlns:ds="http://schemas.openxmlformats.org/officeDocument/2006/customXml" ds:itemID="{432851C6-BC05-4673-B853-6D08AB80CDC4}">
+  <ds:schemaRefs>
+    <ds:schemaRef ds:uri="http://schemas.microsoft.com/VisualStudio/2011/storyboarding/control"/>
+  </ds:schemaRefs>
+</ds:datastoreItem>
+</file>
+
+<file path=customXml/itemProps25.xml><?xml version="1.0" encoding="utf-8"?>
+<ds:datastoreItem xmlns:ds="http://schemas.openxmlformats.org/officeDocument/2006/customXml" ds:itemID="{4E8278DB-3CDD-48A7-992E-A7596AD335B9}">
+  <ds:schemaRefs>
+    <ds:schemaRef ds:uri="http://schemas.microsoft.com/VisualStudio/2011/storyboarding/control"/>
+  </ds:schemaRefs>
+</ds:datastoreItem>
+</file>
+
+<file path=customXml/itemProps26.xml><?xml version="1.0" encoding="utf-8"?>
+<ds:datastoreItem xmlns:ds="http://schemas.openxmlformats.org/officeDocument/2006/customXml" ds:itemID="{366CA990-F93D-4100-9654-65D9E30F4E1C}">
+  <ds:schemaRefs>
+    <ds:schemaRef ds:uri="http://schemas.microsoft.com/VisualStudio/2011/storyboarding/control"/>
+  </ds:schemaRefs>
+</ds:datastoreItem>
+</file>
+
+<file path=customXml/itemProps27.xml><?xml version="1.0" encoding="utf-8"?>
+<ds:datastoreItem xmlns:ds="http://schemas.openxmlformats.org/officeDocument/2006/customXml" ds:itemID="{D4B5F268-5930-44CD-BDF1-D0A04D4BBC1C}">
+  <ds:schemaRefs>
+    <ds:schemaRef ds:uri="http://schemas.microsoft.com/VisualStudio/2011/storyboarding/control"/>
+  </ds:schemaRefs>
+</ds:datastoreItem>
+</file>
+
+<file path=customXml/itemProps28.xml><?xml version="1.0" encoding="utf-8"?>
+<ds:datastoreItem xmlns:ds="http://schemas.openxmlformats.org/officeDocument/2006/customXml" ds:itemID="{4C1B3C27-4803-4D72-A3F8-6668A3F0A24B}">
+  <ds:schemaRefs>
+    <ds:schemaRef ds:uri="http://schemas.microsoft.com/VisualStudio/2011/storyboarding/control"/>
+  </ds:schemaRefs>
+</ds:datastoreItem>
+</file>
+
+<file path=customXml/itemProps29.xml><?xml version="1.0" encoding="utf-8"?>
+<ds:datastoreItem xmlns:ds="http://schemas.openxmlformats.org/officeDocument/2006/customXml" ds:itemID="{42D603BF-B513-4201-A599-21BA0F4FFC40}">
+  <ds:schemaRefs>
+    <ds:schemaRef ds:uri="http://schemas.microsoft.com/VisualStudio/2011/storyboarding/control"/>
+  </ds:schemaRefs>
+</ds:datastoreItem>
+</file>
+
+<file path=customXml/itemProps3.xml><?xml version="1.0" encoding="utf-8"?>
+<ds:datastoreItem xmlns:ds="http://schemas.openxmlformats.org/officeDocument/2006/customXml" ds:itemID="{8BD595CA-AC5E-43B9-B966-E468A16E8322}">
+  <ds:schemaRefs>
+    <ds:schemaRef ds:uri="http://schemas.microsoft.com/VisualStudio/2011/storyboarding/control"/>
+  </ds:schemaRefs>
+</ds:datastoreItem>
+</file>
+
+<file path=customXml/itemProps30.xml><?xml version="1.0" encoding="utf-8"?>
+<ds:datastoreItem xmlns:ds="http://schemas.openxmlformats.org/officeDocument/2006/customXml" ds:itemID="{08C4EE12-DF69-4FFC-9E40-C7991F3490A6}">
+  <ds:schemaRefs>
+    <ds:schemaRef ds:uri="http://schemas.microsoft.com/VisualStudio/2011/storyboarding/control"/>
+  </ds:schemaRefs>
+</ds:datastoreItem>
+</file>
+
 <file path=customXml/itemProps31.xml><?xml version="1.0" encoding="utf-8"?>
+<ds:datastoreItem xmlns:ds="http://schemas.openxmlformats.org/officeDocument/2006/customXml" ds:itemID="{C63AC2F0-1DEB-4E91-A88A-7A014A172F4F}">
+  <ds:schemaRefs>
+    <ds:schemaRef ds:uri="http://schemas.microsoft.com/VisualStudio/2011/storyboarding/control"/>
+  </ds:schemaRefs>
+</ds:datastoreItem>
+</file>
+
+<file path=customXml/itemProps32.xml><?xml version="1.0" encoding="utf-8"?>
+<ds:datastoreItem xmlns:ds="http://schemas.openxmlformats.org/officeDocument/2006/customXml" ds:itemID="{F68D8396-E21C-4AFF-8FDD-70D00673D0EE}">
+  <ds:schemaRefs>
+    <ds:schemaRef ds:uri="http://schemas.microsoft.com/VisualStudio/2011/storyboarding/control"/>
+  </ds:schemaRefs>
+</ds:datastoreItem>
+</file>
+
+<file path=customXml/itemProps33.xml><?xml version="1.0" encoding="utf-8"?>
+<ds:datastoreItem xmlns:ds="http://schemas.openxmlformats.org/officeDocument/2006/customXml" ds:itemID="{6FB9D450-4C47-4A44-8C0D-C78D8A54C46F}">
+  <ds:schemaRefs>
+    <ds:schemaRef ds:uri="http://schemas.microsoft.com/VisualStudio/2011/storyboarding/control"/>
+  </ds:schemaRefs>
+</ds:datastoreItem>
+</file>
+
+<file path=customXml/itemProps34.xml><?xml version="1.0" encoding="utf-8"?>
+<ds:datastoreItem xmlns:ds="http://schemas.openxmlformats.org/officeDocument/2006/customXml" ds:itemID="{F990F116-B58F-4255-B05B-DA3808E0E5C6}">
+  <ds:schemaRefs>
+    <ds:schemaRef ds:uri="http://schemas.microsoft.com/office/2006/metadata/properties"/>
+    <ds:schemaRef ds:uri="http://schemas.microsoft.com/office/infopath/2007/PartnerControls"/>
+    <ds:schemaRef ds:uri="83cd2334-221a-48c3-9034-bfd1542dfe28"/>
+  </ds:schemaRefs>
+</ds:datastoreItem>
+</file>
+
+<file path=customXml/itemProps35.xml><?xml version="1.0" encoding="utf-8"?>
 <ds:datastoreItem xmlns:ds="http://schemas.openxmlformats.org/officeDocument/2006/customXml" ds:itemID="{38217AA1-CC95-49A9-B284-2ED4D347D7CA}">
   <ds:schemaRefs>
     <ds:schemaRef ds:uri="http://schemas.microsoft.com/VisualStudio/2011/storyboarding/control"/>
@@ -43566,40 +43775,8 @@
 </ds:datastoreItem>
 </file>
 
-<file path=customXml/itemProps32.xml><?xml version="1.0" encoding="utf-8"?>
-<ds:datastoreItem xmlns:ds="http://schemas.openxmlformats.org/officeDocument/2006/customXml" ds:itemID="{BBBD849F-7879-4748-B9BA-455CDDECCA4D}">
-  <ds:schemaRefs>
-    <ds:schemaRef ds:uri="http://schemas.microsoft.com/sharepoint/v3/contenttype/forms"/>
-  </ds:schemaRefs>
-</ds:datastoreItem>
-</file>
-
-<file path=customXml/itemProps33.xml><?xml version="1.0" encoding="utf-8"?>
-<ds:datastoreItem xmlns:ds="http://schemas.openxmlformats.org/officeDocument/2006/customXml" ds:itemID="{432851C6-BC05-4673-B853-6D08AB80CDC4}">
-  <ds:schemaRefs>
-    <ds:schemaRef ds:uri="http://schemas.microsoft.com/VisualStudio/2011/storyboarding/control"/>
-  </ds:schemaRefs>
-</ds:datastoreItem>
-</file>
-
-<file path=customXml/itemProps34.xml><?xml version="1.0" encoding="utf-8"?>
-<ds:datastoreItem xmlns:ds="http://schemas.openxmlformats.org/officeDocument/2006/customXml" ds:itemID="{4E805D65-1532-4BB0-8F41-8013167C0009}">
-  <ds:schemaRefs>
-    <ds:schemaRef ds:uri="http://schemas.microsoft.com/VisualStudio/2011/storyboarding/control"/>
-  </ds:schemaRefs>
-</ds:datastoreItem>
-</file>
-
-<file path=customXml/itemProps35.xml><?xml version="1.0" encoding="utf-8"?>
-<ds:datastoreItem xmlns:ds="http://schemas.openxmlformats.org/officeDocument/2006/customXml" ds:itemID="{FE651ABA-5DC1-4ABD-A06E-055AE54B337B}">
-  <ds:schemaRefs>
-    <ds:schemaRef ds:uri="http://schemas.microsoft.com/VisualStudio/2011/storyboarding/control"/>
-  </ds:schemaRefs>
-</ds:datastoreItem>
-</file>
-
 <file path=customXml/itemProps36.xml><?xml version="1.0" encoding="utf-8"?>
-<ds:datastoreItem xmlns:ds="http://schemas.openxmlformats.org/officeDocument/2006/customXml" ds:itemID="{6FB9D450-4C47-4A44-8C0D-C78D8A54C46F}">
+<ds:datastoreItem xmlns:ds="http://schemas.openxmlformats.org/officeDocument/2006/customXml" ds:itemID="{8257D6BC-B71E-4D95-81E4-A1D4A8174168}">
   <ds:schemaRefs>
     <ds:schemaRef ds:uri="http://schemas.microsoft.com/VisualStudio/2011/storyboarding/control"/>
   </ds:schemaRefs>
@@ -43607,15 +43784,15 @@
 </file>
 
 <file path=customXml/itemProps37.xml><?xml version="1.0" encoding="utf-8"?>
-<ds:datastoreItem xmlns:ds="http://schemas.openxmlformats.org/officeDocument/2006/customXml" ds:itemID="{82DB428A-B8F8-483F-8276-095629A8ECDB}">
+<ds:datastoreItem xmlns:ds="http://schemas.openxmlformats.org/officeDocument/2006/customXml" ds:itemID="{758FDAC0-319D-4A54-8D8E-1D42CB1F8004}">
   <ds:schemaRefs>
-    <ds:schemaRef ds:uri="http://schemas.microsoft.com/VisualStudio/2011/storyboarding/control"/>
+    <ds:schemaRef ds:uri="http://schemas.microsoft.com/sharepoint/v3/contenttype/forms"/>
   </ds:schemaRefs>
 </ds:datastoreItem>
 </file>
 
 <file path=customXml/itemProps38.xml><?xml version="1.0" encoding="utf-8"?>
-<ds:datastoreItem xmlns:ds="http://schemas.openxmlformats.org/officeDocument/2006/customXml" ds:itemID="{4E8278DB-3CDD-48A7-992E-A7596AD335B9}">
+<ds:datastoreItem xmlns:ds="http://schemas.openxmlformats.org/officeDocument/2006/customXml" ds:itemID="{D6FEE829-2115-45B4-8110-670FD454542B}">
   <ds:schemaRefs>
     <ds:schemaRef ds:uri="http://schemas.microsoft.com/VisualStudio/2011/storyboarding/control"/>
   </ds:schemaRefs>
@@ -43623,7 +43800,7 @@
 </file>
 
 <file path=customXml/itemProps39.xml><?xml version="1.0" encoding="utf-8"?>
-<ds:datastoreItem xmlns:ds="http://schemas.openxmlformats.org/officeDocument/2006/customXml" ds:itemID="{4B16F4FE-7C26-4443-B426-81998D23ED87}">
+<ds:datastoreItem xmlns:ds="http://schemas.openxmlformats.org/officeDocument/2006/customXml" ds:itemID="{3DC6CABD-46E1-4C27-A0B3-616DC56F8E5C}">
   <ds:schemaRefs>
     <ds:schemaRef ds:uri="http://schemas.microsoft.com/VisualStudio/2011/storyboarding/control"/>
   </ds:schemaRefs>
@@ -43631,7 +43808,7 @@
 </file>
 
 <file path=customXml/itemProps4.xml><?xml version="1.0" encoding="utf-8"?>
-<ds:datastoreItem xmlns:ds="http://schemas.openxmlformats.org/officeDocument/2006/customXml" ds:itemID="{758FDAC0-319D-4A54-8D8E-1D42CB1F8004}">
+<ds:datastoreItem xmlns:ds="http://schemas.openxmlformats.org/officeDocument/2006/customXml" ds:itemID="{9360AFB9-8F99-4E1B-878D-F2EBABEB164C}">
   <ds:schemaRefs>
     <ds:schemaRef ds:uri="http://schemas.microsoft.com/sharepoint/v3/contenttype/forms"/>
   </ds:schemaRefs>
@@ -43639,7 +43816,7 @@
 </file>
 
 <file path=customXml/itemProps40.xml><?xml version="1.0" encoding="utf-8"?>
-<ds:datastoreItem xmlns:ds="http://schemas.openxmlformats.org/officeDocument/2006/customXml" ds:itemID="{9B867D90-26E8-4653-836E-AAA14774DA6A}">
+<ds:datastoreItem xmlns:ds="http://schemas.openxmlformats.org/officeDocument/2006/customXml" ds:itemID="{E692D73E-1478-4790-BEEC-C5C534998F40}">
   <ds:schemaRefs>
     <ds:schemaRef ds:uri="http://schemas.microsoft.com/office/2006/metadata/properties"/>
     <ds:schemaRef ds:uri="http://schemas.microsoft.com/office/infopath/2007/PartnerControls"/>
@@ -43649,7 +43826,7 @@
 </file>
 
 <file path=customXml/itemProps41.xml><?xml version="1.0" encoding="utf-8"?>
-<ds:datastoreItem xmlns:ds="http://schemas.openxmlformats.org/officeDocument/2006/customXml" ds:itemID="{D4B5F268-5930-44CD-BDF1-D0A04D4BBC1C}">
+<ds:datastoreItem xmlns:ds="http://schemas.openxmlformats.org/officeDocument/2006/customXml" ds:itemID="{0282FB20-2D4C-459D-8468-77D1D3C6925D}">
   <ds:schemaRefs>
     <ds:schemaRef ds:uri="http://schemas.microsoft.com/VisualStudio/2011/storyboarding/control"/>
   </ds:schemaRefs>
@@ -43657,7 +43834,7 @@
 </file>
 
 <file path=customXml/itemProps42.xml><?xml version="1.0" encoding="utf-8"?>
-<ds:datastoreItem xmlns:ds="http://schemas.openxmlformats.org/officeDocument/2006/customXml" ds:itemID="{C0F92A87-A216-45A9-B9C0-0515663D35BF}">
+<ds:datastoreItem xmlns:ds="http://schemas.openxmlformats.org/officeDocument/2006/customXml" ds:itemID="{4B16F4FE-7C26-4443-B426-81998D23ED87}">
   <ds:schemaRefs>
     <ds:schemaRef ds:uri="http://schemas.microsoft.com/VisualStudio/2011/storyboarding/control"/>
   </ds:schemaRefs>
@@ -43665,31 +43842,7 @@
 </file>
 
 <file path=customXml/itemProps43.xml><?xml version="1.0" encoding="utf-8"?>
-<ds:datastoreItem xmlns:ds="http://schemas.openxmlformats.org/officeDocument/2006/customXml" ds:itemID="{B5105A87-47B6-44F6-97FD-4619C0556604}">
-  <ds:schemaRefs>
-    <ds:schemaRef ds:uri="http://schemas.microsoft.com/VisualStudio/2011/storyboarding/control"/>
-  </ds:schemaRefs>
-</ds:datastoreItem>
-</file>
-
-<file path=customXml/itemProps44.xml><?xml version="1.0" encoding="utf-8"?>
-<ds:datastoreItem xmlns:ds="http://schemas.openxmlformats.org/officeDocument/2006/customXml" ds:itemID="{8257D6BC-B71E-4D95-81E4-A1D4A8174168}">
-  <ds:schemaRefs>
-    <ds:schemaRef ds:uri="http://schemas.microsoft.com/VisualStudio/2011/storyboarding/control"/>
-  </ds:schemaRefs>
-</ds:datastoreItem>
-</file>
-
-<file path=customXml/itemProps45.xml><?xml version="1.0" encoding="utf-8"?>
-<ds:datastoreItem xmlns:ds="http://schemas.openxmlformats.org/officeDocument/2006/customXml" ds:itemID="{0B54C583-7BAB-4080-8093-C5F84F5A225A}">
-  <ds:schemaRefs>
-    <ds:schemaRef ds:uri="http://schemas.microsoft.com/VisualStudio/2011/storyboarding/control"/>
-  </ds:schemaRefs>
-</ds:datastoreItem>
-</file>
-
-<file path=customXml/itemProps5.xml><?xml version="1.0" encoding="utf-8"?>
-<ds:datastoreItem xmlns:ds="http://schemas.openxmlformats.org/officeDocument/2006/customXml" ds:itemID="{ED3B47FC-4A86-4462-9CF5-F495504794E8}">
+<ds:datastoreItem xmlns:ds="http://schemas.openxmlformats.org/officeDocument/2006/customXml" ds:itemID="{473A6A21-7521-4B81-9336-9B587BA12275}">
   <ds:schemaRefs>
     <ds:schemaRef ds:uri="http://schemas.microsoft.com/office/2006/metadata/properties"/>
     <ds:schemaRef ds:uri="http://schemas.microsoft.com/office/infopath/2007/PartnerControls"/>
@@ -43698,26 +43851,48 @@
 </ds:datastoreItem>
 </file>
 
-<file path=customXml/itemProps6.xml><?xml version="1.0" encoding="utf-8"?>
-<ds:datastoreItem xmlns:ds="http://schemas.openxmlformats.org/officeDocument/2006/customXml" ds:itemID="{42D603BF-B513-4201-A599-21BA0F4FFC40}">
+<file path=customXml/itemProps44.xml><?xml version="1.0" encoding="utf-8"?>
+<ds:datastoreItem xmlns:ds="http://schemas.openxmlformats.org/officeDocument/2006/customXml" ds:itemID="{4E805D65-1532-4BB0-8F41-8013167C0009}">
   <ds:schemaRefs>
     <ds:schemaRef ds:uri="http://schemas.microsoft.com/VisualStudio/2011/storyboarding/control"/>
   </ds:schemaRefs>
 </ds:datastoreItem>
 </file>
 
+<file path=customXml/itemProps45.xml><?xml version="1.0" encoding="utf-8"?>
+<ds:datastoreItem xmlns:ds="http://schemas.openxmlformats.org/officeDocument/2006/customXml" ds:itemID="{C0F92A87-A216-45A9-B9C0-0515663D35BF}">
+  <ds:schemaRefs>
+    <ds:schemaRef ds:uri="http://schemas.microsoft.com/VisualStudio/2011/storyboarding/control"/>
+  </ds:schemaRefs>
+</ds:datastoreItem>
+</file>
+
+<file path=customXml/itemProps5.xml><?xml version="1.0" encoding="utf-8"?>
+<ds:datastoreItem xmlns:ds="http://schemas.openxmlformats.org/officeDocument/2006/customXml" ds:itemID="{1EF25EC2-965B-4491-9691-6B806C9E3B8B}">
+  <ds:schemaRefs>
+    <ds:schemaRef ds:uri="http://schemas.microsoft.com/sharepoint/v3/contenttype/forms"/>
+  </ds:schemaRefs>
+</ds:datastoreItem>
+</file>
+
+<file path=customXml/itemProps6.xml><?xml version="1.0" encoding="utf-8"?>
+<ds:datastoreItem xmlns:ds="http://schemas.openxmlformats.org/officeDocument/2006/customXml" ds:itemID="{689260D6-B6B3-49EB-B7BA-F472BA6A8BA1}">
+  <ds:schemaRefs>
+    <ds:schemaRef ds:uri="http://schemas.microsoft.com/sharepoint/v3/contenttype/forms"/>
+  </ds:schemaRefs>
+</ds:datastoreItem>
+</file>
+
 <file path=customXml/itemProps7.xml><?xml version="1.0" encoding="utf-8"?>
-<ds:datastoreItem xmlns:ds="http://schemas.openxmlformats.org/officeDocument/2006/customXml" ds:itemID="{B18102BA-C10B-41D1-8610-3D321D638DD2}">
+<ds:datastoreItem xmlns:ds="http://schemas.openxmlformats.org/officeDocument/2006/customXml" ds:itemID="{BBBD849F-7879-4748-B9BA-455CDDECCA4D}">
   <ds:schemaRefs>
-    <ds:schemaRef ds:uri="http://schemas.microsoft.com/office/2006/metadata/properties"/>
-    <ds:schemaRef ds:uri="http://schemas.microsoft.com/office/infopath/2007/PartnerControls"/>
-    <ds:schemaRef ds:uri="83cd2334-221a-48c3-9034-bfd1542dfe28"/>
+    <ds:schemaRef ds:uri="http://schemas.microsoft.com/sharepoint/v3/contenttype/forms"/>
   </ds:schemaRefs>
 </ds:datastoreItem>
 </file>
 
 <file path=customXml/itemProps8.xml><?xml version="1.0" encoding="utf-8"?>
-<ds:datastoreItem xmlns:ds="http://schemas.openxmlformats.org/officeDocument/2006/customXml" ds:itemID="{7959CC6A-F423-4783-B968-3BCC86A7394E}">
+<ds:datastoreItem xmlns:ds="http://schemas.openxmlformats.org/officeDocument/2006/customXml" ds:itemID="{82DB428A-B8F8-483F-8276-095629A8ECDB}">
   <ds:schemaRefs>
     <ds:schemaRef ds:uri="http://schemas.microsoft.com/VisualStudio/2011/storyboarding/control"/>
   </ds:schemaRefs>
@@ -43725,9 +43900,11 @@
 </file>
 
 <file path=customXml/itemProps9.xml><?xml version="1.0" encoding="utf-8"?>
-<ds:datastoreItem xmlns:ds="http://schemas.openxmlformats.org/officeDocument/2006/customXml" ds:itemID="{D6FEE829-2115-45B4-8110-670FD454542B}">
+<ds:datastoreItem xmlns:ds="http://schemas.openxmlformats.org/officeDocument/2006/customXml" ds:itemID="{9B867D90-26E8-4653-836E-AAA14774DA6A}">
   <ds:schemaRefs>
-    <ds:schemaRef ds:uri="http://schemas.microsoft.com/VisualStudio/2011/storyboarding/control"/>
+    <ds:schemaRef ds:uri="http://schemas.microsoft.com/office/2006/metadata/properties"/>
+    <ds:schemaRef ds:uri="http://schemas.microsoft.com/office/infopath/2007/PartnerControls"/>
+    <ds:schemaRef ds:uri="83cd2334-221a-48c3-9034-bfd1542dfe28"/>
   </ds:schemaRefs>
 </ds:datastoreItem>
 </file>
</xml_diff>